<commit_message>
made modifications based on Chris' comments
</commit_message>
<xml_diff>
--- a/docs/presentations/OBI workshop Oct 2011 Philly/Ontology Views.pptx
+++ b/docs/presentations/OBI workshop Oct 2011 Philly/Ontology Views.pptx
@@ -248,7 +248,7 @@
               <a:pPr>
                 <a:defRPr/>
               </a:pPr>
-              <a:t>9/29/2011</a:t>
+              <a:t>10/7/2011</a:t>
             </a:fld>
             <a:endParaRPr lang="en-US"/>
           </a:p>
@@ -428,7 +428,7 @@
     </p:spTree>
     <p:extLst>
       <p:ext uri="{BB962C8B-B14F-4D97-AF65-F5344CB8AC3E}">
-        <p14:creationId xmlns:p14="http://schemas.microsoft.com/office/powerpoint/2010/main" xmlns="" val="2084266824"/>
+        <p14:creationId xmlns="" xmlns:p14="http://schemas.microsoft.com/office/powerpoint/2010/main" val="2084266824"/>
       </p:ext>
     </p:extLst>
   </p:cSld>
@@ -7765,7 +7765,7 @@
         </p:nvSpPr>
         <p:spPr bwMode="auto">
           <a:xfrm>
-            <a:off x="4343400" y="1600200"/>
+            <a:off x="4343400" y="1524000"/>
             <a:ext cx="4572000" cy="2209800"/>
           </a:xfrm>
           <a:prstGeom prst="rect">
@@ -7801,6 +7801,28 @@
                 <a:ea typeface="ＭＳ Ｐゴシック" pitchFamily="34" charset="-128"/>
               </a:rPr>
               <a:t>Ruttenberg</a:t>
+            </a:r>
+            <a:endParaRPr lang="en-US" sz="3000" dirty="0" smtClean="0">
+              <a:ea typeface="ＭＳ Ｐゴシック" pitchFamily="34" charset="-128"/>
+            </a:endParaRPr>
+          </a:p>
+          <a:p>
+            <a:pPr marL="342900" indent="-342900">
+              <a:spcBef>
+                <a:spcPct val="20000"/>
+              </a:spcBef>
+              <a:buFontTx/>
+              <a:buChar char="•"/>
+            </a:pPr>
+            <a:r>
+              <a:rPr lang="en-US" sz="3000" dirty="0" smtClean="0">
+                <a:ea typeface="ＭＳ Ｐゴシック" pitchFamily="34" charset="-128"/>
+              </a:rPr>
+              <a:t>Carlo </a:t>
+            </a:r>
+            <a:r>
+              <a:rPr lang="en-US" sz="3200" dirty="0" err="1" smtClean="0"/>
+              <a:t>Torniai</a:t>
             </a:r>
             <a:endParaRPr lang="en-US" sz="3000" dirty="0">
               <a:ea typeface="ＭＳ Ｐゴシック" pitchFamily="34" charset="-128"/>
@@ -9835,11 +9857,7 @@
             <a:p>
               <a:r>
                 <a:rPr lang="en-US" sz="800" dirty="0" smtClean="0"/>
-                <a:t>    </a:t>
-              </a:r>
-              <a:r>
-                <a:rPr lang="en-US" sz="800" dirty="0" smtClean="0"/>
-                <a:t>&lt;</a:t>
+                <a:t>    &lt;</a:t>
               </a:r>
               <a:r>
                 <a:rPr lang="en-US" sz="800" b="1" dirty="0" err="1" smtClean="0"/>
@@ -9855,20 +9873,14 @@
               </a:r>
               <a:r>
                 <a:rPr lang="en-US" sz="800" b="1" dirty="0" smtClean="0"/>
-                <a:t>="http://purl.obolibrary.org/obo/obi/view_annot.owl</a:t>
+                <a:t>="http://purl.obolibrary.org/obo/obi/view_annot.owl"/&gt;</a:t>
               </a:r>
-              <a:r>
-                <a:rPr lang="en-US" sz="800" b="1" dirty="0" smtClean="0"/>
-                <a:t>"/&gt;</a:t>
-              </a:r>
-              <a:endParaRPr lang="en-US" sz="800" b="1" dirty="0" smtClean="0"/>
             </a:p>
             <a:p>
               <a:r>
                 <a:rPr lang="en-US" sz="800" dirty="0" smtClean="0"/>
                 <a:t>    ……</a:t>
               </a:r>
-              <a:endParaRPr lang="en-US" sz="800" dirty="0" smtClean="0"/>
             </a:p>
           </p:txBody>
         </p:sp>
@@ -10555,11 +10567,7 @@
             <a:p>
               <a:r>
                 <a:rPr lang="en-US" sz="1400" dirty="0" smtClean="0"/>
-                <a:t>d</a:t>
-              </a:r>
-              <a:r>
-                <a:rPr lang="en-US" sz="1400" dirty="0" smtClean="0"/>
-                <a:t>efined in         or</a:t>
+                <a:t>defined in         or</a:t>
               </a:r>
               <a:endParaRPr lang="en-US" sz="1400" dirty="0"/>
             </a:p>

</xml_diff>